<commit_message>
Aanpassing van de wireframe
</commit_message>
<xml_diff>
--- a/Wireframe_dashboard.pptx
+++ b/Wireframe_dashboard.pptx
@@ -6,7 +6,8 @@
   </p:sldMasterIdLst>
   <p:sldIdLst>
     <p:sldId id="267" r:id="rId5"/>
-    <p:sldId id="266" r:id="rId6"/>
+    <p:sldId id="268" r:id="rId6"/>
+    <p:sldId id="266" r:id="rId7"/>
   </p:sldIdLst>
   <p:sldSz cx="12192000" cy="6858000"/>
   <p:notesSz cx="6858000" cy="9144000"/>
@@ -3860,6 +3861,72 @@
           </a:p>
         </p:txBody>
       </p:sp>
+      <p:sp>
+        <p:nvSpPr>
+          <p:cNvPr id="2" name="Rectangle 1">
+            <a:extLst>
+              <a:ext uri="{FF2B5EF4-FFF2-40B4-BE49-F238E27FC236}">
+                <a16:creationId xmlns:a16="http://schemas.microsoft.com/office/drawing/2014/main" id="{AA77EAA9-8893-48BF-B996-8EFDA9547C1F}"/>
+              </a:ext>
+            </a:extLst>
+          </p:cNvPr>
+          <p:cNvSpPr/>
+          <p:nvPr/>
+        </p:nvSpPr>
+        <p:spPr>
+          <a:xfrm>
+            <a:off x="4030462" y="745724"/>
+            <a:ext cx="2157274" cy="466987"/>
+          </a:xfrm>
+          <a:prstGeom prst="rect">
+            <a:avLst/>
+          </a:prstGeom>
+        </p:spPr>
+        <p:style>
+          <a:lnRef idx="2">
+            <a:schemeClr val="dk1">
+              <a:shade val="50000"/>
+            </a:schemeClr>
+          </a:lnRef>
+          <a:fillRef idx="1">
+            <a:schemeClr val="dk1"/>
+          </a:fillRef>
+          <a:effectRef idx="0">
+            <a:schemeClr val="dk1"/>
+          </a:effectRef>
+          <a:fontRef idx="minor">
+            <a:schemeClr val="lt1"/>
+          </a:fontRef>
+        </p:style>
+        <p:txBody>
+          <a:bodyPr rtlCol="0" anchor="ctr"/>
+          <a:lstStyle/>
+          <a:p>
+            <a:pPr algn="ctr"/>
+            <a:r>
+              <a:rPr lang="en-NL" dirty="0" err="1"/>
+              <a:t>Informatie</a:t>
+            </a:r>
+            <a:r>
+              <a:rPr lang="en-NL" dirty="0"/>
+              <a:t> van </a:t>
+            </a:r>
+            <a:r>
+              <a:rPr lang="en-NL" dirty="0" err="1"/>
+              <a:t>aannemer</a:t>
+            </a:r>
+            <a:r>
+              <a:rPr lang="en-NL" dirty="0"/>
+              <a:t> </a:t>
+            </a:r>
+            <a:r>
+              <a:rPr lang="en-NL" dirty="0" err="1"/>
+              <a:t>invoeren</a:t>
+            </a:r>
+            <a:endParaRPr lang="en-NL" dirty="0"/>
+          </a:p>
+        </p:txBody>
+      </p:sp>
     </p:spTree>
     <p:extLst>
       <p:ext uri="{BB962C8B-B14F-4D97-AF65-F5344CB8AC3E}">
@@ -3912,13 +3979,7 @@
           <p:cNvGraphicFramePr>
             <a:graphicFrameLocks noGrp="1"/>
           </p:cNvGraphicFramePr>
-          <p:nvPr>
-            <p:extLst>
-              <p:ext uri="{D42A27DB-BD31-4B8C-83A1-F6EECF244321}">
-                <p14:modId xmlns:p14="http://schemas.microsoft.com/office/powerpoint/2010/main" val="1256834598"/>
-              </p:ext>
-            </p:extLst>
-          </p:nvPr>
+          <p:nvPr/>
         </p:nvGraphicFramePr>
         <p:xfrm>
           <a:off x="875774" y="2514599"/>
@@ -4386,7 +4447,1116 @@
           <a:p>
             <a:r>
               <a:rPr lang="en-NL" b="1" dirty="0"/>
-              <a:t>Welkom planners van </a:t>
+              <a:t>Welkom </a:t>
+            </a:r>
+            <a:r>
+              <a:rPr lang="en-NL" b="1" dirty="0" err="1"/>
+              <a:t>treindienstleiders</a:t>
+            </a:r>
+            <a:r>
+              <a:rPr lang="en-NL" b="1" dirty="0"/>
+              <a:t> van </a:t>
+            </a:r>
+            <a:r>
+              <a:rPr lang="en-NL" b="1" dirty="0" err="1"/>
+              <a:t>Prorail</a:t>
+            </a:r>
+            <a:endParaRPr lang="en-NL" b="1" dirty="0"/>
+          </a:p>
+        </p:txBody>
+      </p:sp>
+      <p:sp>
+        <p:nvSpPr>
+          <p:cNvPr id="2" name="Rectangle 1">
+            <a:extLst>
+              <a:ext uri="{FF2B5EF4-FFF2-40B4-BE49-F238E27FC236}">
+                <a16:creationId xmlns:a16="http://schemas.microsoft.com/office/drawing/2014/main" id="{AA77EAA9-8893-48BF-B996-8EFDA9547C1F}"/>
+              </a:ext>
+            </a:extLst>
+          </p:cNvPr>
+          <p:cNvSpPr/>
+          <p:nvPr/>
+        </p:nvSpPr>
+        <p:spPr>
+          <a:xfrm>
+            <a:off x="4030462" y="745724"/>
+            <a:ext cx="2157274" cy="466987"/>
+          </a:xfrm>
+          <a:prstGeom prst="rect">
+            <a:avLst/>
+          </a:prstGeom>
+        </p:spPr>
+        <p:style>
+          <a:lnRef idx="2">
+            <a:schemeClr val="dk1">
+              <a:shade val="50000"/>
+            </a:schemeClr>
+          </a:lnRef>
+          <a:fillRef idx="1">
+            <a:schemeClr val="dk1"/>
+          </a:fillRef>
+          <a:effectRef idx="0">
+            <a:schemeClr val="dk1"/>
+          </a:effectRef>
+          <a:fontRef idx="minor">
+            <a:schemeClr val="lt1"/>
+          </a:fontRef>
+        </p:style>
+        <p:txBody>
+          <a:bodyPr rtlCol="0" anchor="ctr"/>
+          <a:lstStyle/>
+          <a:p>
+            <a:pPr algn="ctr"/>
+            <a:r>
+              <a:rPr lang="en-NL" dirty="0" err="1"/>
+              <a:t>Informatie</a:t>
+            </a:r>
+            <a:r>
+              <a:rPr lang="en-NL" dirty="0"/>
+              <a:t> van </a:t>
+            </a:r>
+            <a:r>
+              <a:rPr lang="en-NL" dirty="0" err="1"/>
+              <a:t>aannemer</a:t>
+            </a:r>
+            <a:r>
+              <a:rPr lang="en-NL" dirty="0"/>
+              <a:t> </a:t>
+            </a:r>
+            <a:r>
+              <a:rPr lang="en-NL" dirty="0" err="1"/>
+              <a:t>invoeren</a:t>
+            </a:r>
+            <a:endParaRPr lang="en-NL" dirty="0"/>
+          </a:p>
+        </p:txBody>
+      </p:sp>
+      <p:sp>
+        <p:nvSpPr>
+          <p:cNvPr id="3" name="Rectangle 2">
+            <a:extLst>
+              <a:ext uri="{FF2B5EF4-FFF2-40B4-BE49-F238E27FC236}">
+                <a16:creationId xmlns:a16="http://schemas.microsoft.com/office/drawing/2014/main" id="{627CEDC4-973B-429D-B3AD-2726E4B0E929}"/>
+              </a:ext>
+            </a:extLst>
+          </p:cNvPr>
+          <p:cNvSpPr/>
+          <p:nvPr/>
+        </p:nvSpPr>
+        <p:spPr>
+          <a:xfrm>
+            <a:off x="7187381" y="1656240"/>
+            <a:ext cx="4345858" cy="4351270"/>
+          </a:xfrm>
+          <a:prstGeom prst="rect">
+            <a:avLst/>
+          </a:prstGeom>
+        </p:spPr>
+        <p:style>
+          <a:lnRef idx="2">
+            <a:schemeClr val="accent1">
+              <a:shade val="50000"/>
+            </a:schemeClr>
+          </a:lnRef>
+          <a:fillRef idx="1">
+            <a:schemeClr val="accent1"/>
+          </a:fillRef>
+          <a:effectRef idx="0">
+            <a:schemeClr val="accent1"/>
+          </a:effectRef>
+          <a:fontRef idx="minor">
+            <a:schemeClr val="lt1"/>
+          </a:fontRef>
+        </p:style>
+        <p:txBody>
+          <a:bodyPr rtlCol="0" anchor="ctr"/>
+          <a:lstStyle/>
+          <a:p>
+            <a:pPr algn="ctr"/>
+            <a:endParaRPr lang="en-NL"/>
+          </a:p>
+        </p:txBody>
+      </p:sp>
+      <p:sp>
+        <p:nvSpPr>
+          <p:cNvPr id="4" name="Rectangle 3">
+            <a:extLst>
+              <a:ext uri="{FF2B5EF4-FFF2-40B4-BE49-F238E27FC236}">
+                <a16:creationId xmlns:a16="http://schemas.microsoft.com/office/drawing/2014/main" id="{63CD2E2E-C2EC-4D84-9917-54A57CE950A1}"/>
+              </a:ext>
+            </a:extLst>
+          </p:cNvPr>
+          <p:cNvSpPr/>
+          <p:nvPr/>
+        </p:nvSpPr>
+        <p:spPr>
+          <a:xfrm>
+            <a:off x="8499986" y="2514599"/>
+            <a:ext cx="1563329" cy="336119"/>
+          </a:xfrm>
+          <a:prstGeom prst="rect">
+            <a:avLst/>
+          </a:prstGeom>
+          <a:solidFill>
+            <a:schemeClr val="bg1"/>
+          </a:solidFill>
+        </p:spPr>
+        <p:style>
+          <a:lnRef idx="2">
+            <a:schemeClr val="accent1">
+              <a:shade val="50000"/>
+            </a:schemeClr>
+          </a:lnRef>
+          <a:fillRef idx="1">
+            <a:schemeClr val="accent1"/>
+          </a:fillRef>
+          <a:effectRef idx="0">
+            <a:schemeClr val="accent1"/>
+          </a:effectRef>
+          <a:fontRef idx="minor">
+            <a:schemeClr val="lt1"/>
+          </a:fontRef>
+        </p:style>
+        <p:txBody>
+          <a:bodyPr rtlCol="0" anchor="ctr"/>
+          <a:lstStyle/>
+          <a:p>
+            <a:pPr algn="ctr"/>
+            <a:endParaRPr lang="en-NL"/>
+          </a:p>
+        </p:txBody>
+      </p:sp>
+      <p:sp>
+        <p:nvSpPr>
+          <p:cNvPr id="10" name="Rectangle 9">
+            <a:extLst>
+              <a:ext uri="{FF2B5EF4-FFF2-40B4-BE49-F238E27FC236}">
+                <a16:creationId xmlns:a16="http://schemas.microsoft.com/office/drawing/2014/main" id="{F394307C-399C-435D-8EE2-6F9FD5B84FA3}"/>
+              </a:ext>
+            </a:extLst>
+          </p:cNvPr>
+          <p:cNvSpPr/>
+          <p:nvPr/>
+        </p:nvSpPr>
+        <p:spPr>
+          <a:xfrm>
+            <a:off x="8499987" y="3092881"/>
+            <a:ext cx="1563329" cy="336119"/>
+          </a:xfrm>
+          <a:prstGeom prst="rect">
+            <a:avLst/>
+          </a:prstGeom>
+          <a:solidFill>
+            <a:schemeClr val="bg1"/>
+          </a:solidFill>
+        </p:spPr>
+        <p:style>
+          <a:lnRef idx="2">
+            <a:schemeClr val="accent1">
+              <a:shade val="50000"/>
+            </a:schemeClr>
+          </a:lnRef>
+          <a:fillRef idx="1">
+            <a:schemeClr val="accent1"/>
+          </a:fillRef>
+          <a:effectRef idx="0">
+            <a:schemeClr val="accent1"/>
+          </a:effectRef>
+          <a:fontRef idx="minor">
+            <a:schemeClr val="lt1"/>
+          </a:fontRef>
+        </p:style>
+        <p:txBody>
+          <a:bodyPr rtlCol="0" anchor="ctr"/>
+          <a:lstStyle/>
+          <a:p>
+            <a:pPr algn="ctr"/>
+            <a:endParaRPr lang="en-NL"/>
+          </a:p>
+        </p:txBody>
+      </p:sp>
+      <p:sp>
+        <p:nvSpPr>
+          <p:cNvPr id="12" name="Rectangle 11">
+            <a:extLst>
+              <a:ext uri="{FF2B5EF4-FFF2-40B4-BE49-F238E27FC236}">
+                <a16:creationId xmlns:a16="http://schemas.microsoft.com/office/drawing/2014/main" id="{4F2879DC-D7CE-4AB8-B17F-47ACDFD44759}"/>
+              </a:ext>
+            </a:extLst>
+          </p:cNvPr>
+          <p:cNvSpPr/>
+          <p:nvPr/>
+        </p:nvSpPr>
+        <p:spPr>
+          <a:xfrm>
+            <a:off x="8499985" y="3663513"/>
+            <a:ext cx="1563329" cy="336119"/>
+          </a:xfrm>
+          <a:prstGeom prst="rect">
+            <a:avLst/>
+          </a:prstGeom>
+          <a:solidFill>
+            <a:schemeClr val="bg1"/>
+          </a:solidFill>
+        </p:spPr>
+        <p:style>
+          <a:lnRef idx="2">
+            <a:schemeClr val="accent1">
+              <a:shade val="50000"/>
+            </a:schemeClr>
+          </a:lnRef>
+          <a:fillRef idx="1">
+            <a:schemeClr val="accent1"/>
+          </a:fillRef>
+          <a:effectRef idx="0">
+            <a:schemeClr val="accent1"/>
+          </a:effectRef>
+          <a:fontRef idx="minor">
+            <a:schemeClr val="lt1"/>
+          </a:fontRef>
+        </p:style>
+        <p:txBody>
+          <a:bodyPr rtlCol="0" anchor="ctr"/>
+          <a:lstStyle/>
+          <a:p>
+            <a:pPr algn="ctr"/>
+            <a:endParaRPr lang="en-NL"/>
+          </a:p>
+        </p:txBody>
+      </p:sp>
+      <p:sp>
+        <p:nvSpPr>
+          <p:cNvPr id="14" name="Rectangle 13">
+            <a:extLst>
+              <a:ext uri="{FF2B5EF4-FFF2-40B4-BE49-F238E27FC236}">
+                <a16:creationId xmlns:a16="http://schemas.microsoft.com/office/drawing/2014/main" id="{C7FD3BCC-244F-4E18-836D-A5FF2C7DA4E3}"/>
+              </a:ext>
+            </a:extLst>
+          </p:cNvPr>
+          <p:cNvSpPr/>
+          <p:nvPr/>
+        </p:nvSpPr>
+        <p:spPr>
+          <a:xfrm>
+            <a:off x="8499985" y="4289541"/>
+            <a:ext cx="1563329" cy="336119"/>
+          </a:xfrm>
+          <a:prstGeom prst="rect">
+            <a:avLst/>
+          </a:prstGeom>
+          <a:solidFill>
+            <a:schemeClr val="bg1"/>
+          </a:solidFill>
+        </p:spPr>
+        <p:style>
+          <a:lnRef idx="2">
+            <a:schemeClr val="accent1">
+              <a:shade val="50000"/>
+            </a:schemeClr>
+          </a:lnRef>
+          <a:fillRef idx="1">
+            <a:schemeClr val="accent1"/>
+          </a:fillRef>
+          <a:effectRef idx="0">
+            <a:schemeClr val="accent1"/>
+          </a:effectRef>
+          <a:fontRef idx="minor">
+            <a:schemeClr val="lt1"/>
+          </a:fontRef>
+        </p:style>
+        <p:txBody>
+          <a:bodyPr rtlCol="0" anchor="ctr"/>
+          <a:lstStyle/>
+          <a:p>
+            <a:pPr algn="ctr"/>
+            <a:endParaRPr lang="en-NL"/>
+          </a:p>
+        </p:txBody>
+      </p:sp>
+      <p:sp>
+        <p:nvSpPr>
+          <p:cNvPr id="15" name="TextBox 14">
+            <a:extLst>
+              <a:ext uri="{FF2B5EF4-FFF2-40B4-BE49-F238E27FC236}">
+                <a16:creationId xmlns:a16="http://schemas.microsoft.com/office/drawing/2014/main" id="{A883D493-21A9-4CA6-9700-F9238BEC859A}"/>
+              </a:ext>
+            </a:extLst>
+          </p:cNvPr>
+          <p:cNvSpPr txBox="1"/>
+          <p:nvPr/>
+        </p:nvSpPr>
+        <p:spPr>
+          <a:xfrm>
+            <a:off x="7305367" y="2491817"/>
+            <a:ext cx="1130709" cy="369332"/>
+          </a:xfrm>
+          <a:prstGeom prst="rect">
+            <a:avLst/>
+          </a:prstGeom>
+          <a:noFill/>
+        </p:spPr>
+        <p:txBody>
+          <a:bodyPr wrap="square" rtlCol="0">
+            <a:spAutoFit/>
+          </a:bodyPr>
+          <a:lstStyle/>
+          <a:p>
+            <a:r>
+              <a:rPr lang="en-NL" dirty="0"/>
+              <a:t>Prognose</a:t>
+            </a:r>
+          </a:p>
+        </p:txBody>
+      </p:sp>
+      <p:sp>
+        <p:nvSpPr>
+          <p:cNvPr id="16" name="TextBox 15">
+            <a:extLst>
+              <a:ext uri="{FF2B5EF4-FFF2-40B4-BE49-F238E27FC236}">
+                <a16:creationId xmlns:a16="http://schemas.microsoft.com/office/drawing/2014/main" id="{7F0F922C-6EB8-4642-9BD1-8A68BD5C0D40}"/>
+              </a:ext>
+            </a:extLst>
+          </p:cNvPr>
+          <p:cNvSpPr txBox="1"/>
+          <p:nvPr/>
+        </p:nvSpPr>
+        <p:spPr>
+          <a:xfrm>
+            <a:off x="7305367" y="3118097"/>
+            <a:ext cx="1248695" cy="369332"/>
+          </a:xfrm>
+          <a:prstGeom prst="rect">
+            <a:avLst/>
+          </a:prstGeom>
+          <a:noFill/>
+        </p:spPr>
+        <p:txBody>
+          <a:bodyPr wrap="square" rtlCol="0">
+            <a:spAutoFit/>
+          </a:bodyPr>
+          <a:lstStyle/>
+          <a:p>
+            <a:r>
+              <a:rPr lang="en-NL" dirty="0"/>
+              <a:t>Feature x</a:t>
+            </a:r>
+          </a:p>
+        </p:txBody>
+      </p:sp>
+      <p:sp>
+        <p:nvSpPr>
+          <p:cNvPr id="18" name="TextBox 17">
+            <a:extLst>
+              <a:ext uri="{FF2B5EF4-FFF2-40B4-BE49-F238E27FC236}">
+                <a16:creationId xmlns:a16="http://schemas.microsoft.com/office/drawing/2014/main" id="{1C5C1FF3-1102-4B47-A76E-D561D8D47E0B}"/>
+              </a:ext>
+            </a:extLst>
+          </p:cNvPr>
+          <p:cNvSpPr txBox="1"/>
+          <p:nvPr/>
+        </p:nvSpPr>
+        <p:spPr>
+          <a:xfrm>
+            <a:off x="7305367" y="3671163"/>
+            <a:ext cx="1248695" cy="369332"/>
+          </a:xfrm>
+          <a:prstGeom prst="rect">
+            <a:avLst/>
+          </a:prstGeom>
+          <a:noFill/>
+        </p:spPr>
+        <p:txBody>
+          <a:bodyPr wrap="square" rtlCol="0">
+            <a:spAutoFit/>
+          </a:bodyPr>
+          <a:lstStyle/>
+          <a:p>
+            <a:r>
+              <a:rPr lang="en-NL" dirty="0"/>
+              <a:t>Feature y</a:t>
+            </a:r>
+          </a:p>
+        </p:txBody>
+      </p:sp>
+      <p:sp>
+        <p:nvSpPr>
+          <p:cNvPr id="20" name="TextBox 19">
+            <a:extLst>
+              <a:ext uri="{FF2B5EF4-FFF2-40B4-BE49-F238E27FC236}">
+                <a16:creationId xmlns:a16="http://schemas.microsoft.com/office/drawing/2014/main" id="{754C3E08-300E-4C46-A756-6F73167E57DE}"/>
+              </a:ext>
+            </a:extLst>
+          </p:cNvPr>
+          <p:cNvSpPr txBox="1"/>
+          <p:nvPr/>
+        </p:nvSpPr>
+        <p:spPr>
+          <a:xfrm>
+            <a:off x="7305367" y="4286270"/>
+            <a:ext cx="1248695" cy="369332"/>
+          </a:xfrm>
+          <a:prstGeom prst="rect">
+            <a:avLst/>
+          </a:prstGeom>
+          <a:noFill/>
+        </p:spPr>
+        <p:txBody>
+          <a:bodyPr wrap="square" rtlCol="0">
+            <a:spAutoFit/>
+          </a:bodyPr>
+          <a:lstStyle/>
+          <a:p>
+            <a:r>
+              <a:rPr lang="en-NL" dirty="0"/>
+              <a:t>Feature z</a:t>
+            </a:r>
+          </a:p>
+        </p:txBody>
+      </p:sp>
+      <p:sp>
+        <p:nvSpPr>
+          <p:cNvPr id="21" name="TextBox 20">
+            <a:extLst>
+              <a:ext uri="{FF2B5EF4-FFF2-40B4-BE49-F238E27FC236}">
+                <a16:creationId xmlns:a16="http://schemas.microsoft.com/office/drawing/2014/main" id="{3647C76B-4B0E-4A1A-8E7B-5D3A0E8EF802}"/>
+              </a:ext>
+            </a:extLst>
+          </p:cNvPr>
+          <p:cNvSpPr txBox="1"/>
+          <p:nvPr/>
+        </p:nvSpPr>
+        <p:spPr>
+          <a:xfrm>
+            <a:off x="7393858" y="1877972"/>
+            <a:ext cx="3519948" cy="369332"/>
+          </a:xfrm>
+          <a:prstGeom prst="rect">
+            <a:avLst/>
+          </a:prstGeom>
+          <a:noFill/>
+        </p:spPr>
+        <p:txBody>
+          <a:bodyPr wrap="square" rtlCol="0">
+            <a:spAutoFit/>
+          </a:bodyPr>
+          <a:lstStyle/>
+          <a:p>
+            <a:r>
+              <a:rPr lang="en-NL" b="1" dirty="0"/>
+              <a:t>Prognose </a:t>
+            </a:r>
+            <a:r>
+              <a:rPr lang="en-NL" b="1" dirty="0" err="1"/>
+              <a:t>en</a:t>
+            </a:r>
+            <a:r>
+              <a:rPr lang="en-NL" b="1" dirty="0"/>
+              <a:t> </a:t>
+            </a:r>
+            <a:r>
+              <a:rPr lang="en-NL" b="1" dirty="0" err="1"/>
+              <a:t>gegevens</a:t>
+            </a:r>
+            <a:r>
+              <a:rPr lang="en-NL" b="1" dirty="0"/>
+              <a:t> </a:t>
+            </a:r>
+            <a:r>
+              <a:rPr lang="en-NL" b="1" dirty="0" err="1"/>
+              <a:t>invoeren</a:t>
+            </a:r>
+            <a:endParaRPr lang="en-NL" b="1" dirty="0"/>
+          </a:p>
+        </p:txBody>
+      </p:sp>
+      <p:sp>
+        <p:nvSpPr>
+          <p:cNvPr id="22" name="Rectangle 21">
+            <a:extLst>
+              <a:ext uri="{FF2B5EF4-FFF2-40B4-BE49-F238E27FC236}">
+                <a16:creationId xmlns:a16="http://schemas.microsoft.com/office/drawing/2014/main" id="{F8E66B90-27EC-44DC-A7F8-611098207FD2}"/>
+              </a:ext>
+            </a:extLst>
+          </p:cNvPr>
+          <p:cNvSpPr/>
+          <p:nvPr/>
+        </p:nvSpPr>
+        <p:spPr>
+          <a:xfrm>
+            <a:off x="10063314" y="5034116"/>
+            <a:ext cx="1252912" cy="471949"/>
+          </a:xfrm>
+          <a:prstGeom prst="rect">
+            <a:avLst/>
+          </a:prstGeom>
+        </p:spPr>
+        <p:style>
+          <a:lnRef idx="2">
+            <a:schemeClr val="dk1">
+              <a:shade val="50000"/>
+            </a:schemeClr>
+          </a:lnRef>
+          <a:fillRef idx="1">
+            <a:schemeClr val="dk1"/>
+          </a:fillRef>
+          <a:effectRef idx="0">
+            <a:schemeClr val="dk1"/>
+          </a:effectRef>
+          <a:fontRef idx="minor">
+            <a:schemeClr val="lt1"/>
+          </a:fontRef>
+        </p:style>
+        <p:txBody>
+          <a:bodyPr rtlCol="0" anchor="ctr"/>
+          <a:lstStyle/>
+          <a:p>
+            <a:pPr algn="ctr"/>
+            <a:r>
+              <a:rPr lang="en-NL" dirty="0" err="1"/>
+              <a:t>Sturen</a:t>
+            </a:r>
+            <a:r>
+              <a:rPr lang="en-NL" dirty="0"/>
+              <a:t> </a:t>
+            </a:r>
+          </a:p>
+        </p:txBody>
+      </p:sp>
+    </p:spTree>
+    <p:extLst>
+      <p:ext uri="{BB962C8B-B14F-4D97-AF65-F5344CB8AC3E}">
+        <p14:creationId xmlns:p14="http://schemas.microsoft.com/office/powerpoint/2010/main" val="1027521512"/>
+      </p:ext>
+    </p:extLst>
+  </p:cSld>
+  <p:clrMapOvr>
+    <a:masterClrMapping/>
+  </p:clrMapOvr>
+</p:sld>
+</file>
+
+<file path=ppt/slides/slide3.xml><?xml version="1.0" encoding="utf-8"?>
+<p:sld xmlns:a="http://schemas.openxmlformats.org/drawingml/2006/main" xmlns:r="http://schemas.openxmlformats.org/officeDocument/2006/relationships" xmlns:p="http://schemas.openxmlformats.org/presentationml/2006/main">
+  <p:cSld>
+    <p:bg>
+      <p:bgPr>
+        <a:solidFill>
+          <a:schemeClr val="bg2">
+            <a:lumMod val="75000"/>
+          </a:schemeClr>
+        </a:solidFill>
+        <a:effectLst/>
+      </p:bgPr>
+    </p:bg>
+    <p:spTree>
+      <p:nvGrpSpPr>
+        <p:cNvPr id="1" name=""/>
+        <p:cNvGrpSpPr/>
+        <p:nvPr/>
+      </p:nvGrpSpPr>
+      <p:grpSpPr>
+        <a:xfrm>
+          <a:off x="0" y="0"/>
+          <a:ext cx="0" cy="0"/>
+          <a:chOff x="0" y="0"/>
+          <a:chExt cx="0" cy="0"/>
+        </a:xfrm>
+      </p:grpSpPr>
+      <p:graphicFrame>
+        <p:nvGraphicFramePr>
+          <p:cNvPr id="5" name="Table 5">
+            <a:extLst>
+              <a:ext uri="{FF2B5EF4-FFF2-40B4-BE49-F238E27FC236}">
+                <a16:creationId xmlns:a16="http://schemas.microsoft.com/office/drawing/2014/main" id="{30FA021D-6A6A-4743-8B3F-3B5DC85BC0E3}"/>
+              </a:ext>
+            </a:extLst>
+          </p:cNvPr>
+          <p:cNvGraphicFramePr>
+            <a:graphicFrameLocks noGrp="1"/>
+          </p:cNvGraphicFramePr>
+          <p:nvPr>
+            <p:extLst>
+              <p:ext uri="{D42A27DB-BD31-4B8C-83A1-F6EECF244321}">
+                <p14:modId xmlns:p14="http://schemas.microsoft.com/office/powerpoint/2010/main" val="1256834598"/>
+              </p:ext>
+            </p:extLst>
+          </p:nvPr>
+        </p:nvGraphicFramePr>
+        <p:xfrm>
+          <a:off x="875774" y="2514599"/>
+          <a:ext cx="5553600" cy="3877705"/>
+        </p:xfrm>
+        <a:graphic>
+          <a:graphicData uri="http://schemas.openxmlformats.org/drawingml/2006/table">
+            <a:tbl>
+              <a:tblPr firstRow="1" bandRow="1">
+                <a:tableStyleId>{5C22544A-7EE6-4342-B048-85BDC9FD1C3A}</a:tableStyleId>
+              </a:tblPr>
+              <a:tblGrid>
+                <a:gridCol w="1851200">
+                  <a:extLst>
+                    <a:ext uri="{9D8B030D-6E8A-4147-A177-3AD203B41FA5}">
+                      <a16:colId xmlns:a16="http://schemas.microsoft.com/office/drawing/2014/main" val="4100399191"/>
+                    </a:ext>
+                  </a:extLst>
+                </a:gridCol>
+                <a:gridCol w="1851200">
+                  <a:extLst>
+                    <a:ext uri="{9D8B030D-6E8A-4147-A177-3AD203B41FA5}">
+                      <a16:colId xmlns:a16="http://schemas.microsoft.com/office/drawing/2014/main" val="4060147756"/>
+                    </a:ext>
+                  </a:extLst>
+                </a:gridCol>
+                <a:gridCol w="1851200">
+                  <a:extLst>
+                    <a:ext uri="{9D8B030D-6E8A-4147-A177-3AD203B41FA5}">
+                      <a16:colId xmlns:a16="http://schemas.microsoft.com/office/drawing/2014/main" val="1526341197"/>
+                    </a:ext>
+                  </a:extLst>
+                </a:gridCol>
+              </a:tblGrid>
+              <a:tr h="1574524">
+                <a:tc>
+                  <a:txBody>
+                    <a:bodyPr/>
+                    <a:lstStyle/>
+                    <a:p>
+                      <a:r>
+                        <a:rPr lang="en-NL" dirty="0" err="1"/>
+                        <a:t>Trein</a:t>
+                      </a:r>
+                      <a:r>
+                        <a:rPr lang="en-NL" dirty="0"/>
+                        <a:t> storing (</a:t>
+                      </a:r>
+                      <a:r>
+                        <a:rPr lang="en-NL" dirty="0" err="1"/>
+                        <a:t>locatie</a:t>
+                      </a:r>
+                      <a:r>
+                        <a:rPr lang="en-NL" dirty="0"/>
+                        <a:t>, datum)</a:t>
+                      </a:r>
+                    </a:p>
+                  </a:txBody>
+                  <a:tcPr/>
+                </a:tc>
+                <a:tc>
+                  <a:txBody>
+                    <a:bodyPr/>
+                    <a:lstStyle/>
+                    <a:p>
+                      <a:pPr marL="0" marR="0" lvl="0" indent="0" algn="l" defTabSz="914400" rtl="0" eaLnBrk="1" fontAlgn="auto" latinLnBrk="0" hangingPunct="1">
+                        <a:lnSpc>
+                          <a:spcPct val="100000"/>
+                        </a:lnSpc>
+                        <a:spcBef>
+                          <a:spcPts val="0"/>
+                        </a:spcBef>
+                        <a:spcAft>
+                          <a:spcPts val="0"/>
+                        </a:spcAft>
+                        <a:buClrTx/>
+                        <a:buSzTx/>
+                        <a:buFontTx/>
+                        <a:buNone/>
+                        <a:tabLst/>
+                        <a:defRPr/>
+                      </a:pPr>
+                      <a:r>
+                        <a:rPr lang="en-NL" dirty="0" err="1"/>
+                        <a:t>Voorspellende</a:t>
+                      </a:r>
+                      <a:r>
+                        <a:rPr lang="en-NL" dirty="0"/>
+                        <a:t> </a:t>
+                      </a:r>
+                      <a:r>
+                        <a:rPr lang="en-NL" dirty="0" err="1"/>
+                        <a:t>reparatie</a:t>
+                      </a:r>
+                      <a:r>
+                        <a:rPr lang="en-NL" dirty="0"/>
+                        <a:t> </a:t>
+                      </a:r>
+                      <a:r>
+                        <a:rPr lang="en-NL" dirty="0" err="1"/>
+                        <a:t>tijd</a:t>
+                      </a:r>
+                      <a:endParaRPr lang="en-NL" dirty="0"/>
+                    </a:p>
+                    <a:p>
+                      <a:r>
+                        <a:rPr lang="en-NL" dirty="0"/>
+                        <a:t>in min </a:t>
+                      </a:r>
+                    </a:p>
+                  </a:txBody>
+                  <a:tcPr/>
+                </a:tc>
+                <a:tc>
+                  <a:txBody>
+                    <a:bodyPr/>
+                    <a:lstStyle/>
+                    <a:p>
+                      <a:r>
+                        <a:rPr lang="en-NL" dirty="0" err="1"/>
+                        <a:t>Betrouwbaarheid</a:t>
+                      </a:r>
+                      <a:r>
+                        <a:rPr lang="en-NL" dirty="0"/>
+                        <a:t> </a:t>
+                      </a:r>
+                      <a:r>
+                        <a:rPr lang="en-NL" dirty="0" err="1"/>
+                        <a:t>reparatietijd</a:t>
+                      </a:r>
+                      <a:r>
+                        <a:rPr lang="en-NL" dirty="0"/>
+                        <a:t>. </a:t>
+                      </a:r>
+                      <a:r>
+                        <a:rPr lang="nl-NL" dirty="0"/>
+                        <a:t>I</a:t>
+                      </a:r>
+                      <a:r>
+                        <a:rPr lang="en-NL" dirty="0"/>
+                        <a:t>n %</a:t>
+                      </a:r>
+                    </a:p>
+                  </a:txBody>
+                  <a:tcPr/>
+                </a:tc>
+                <a:extLst>
+                  <a:ext uri="{0D108BD9-81ED-4DB2-BD59-A6C34878D82A}">
+                    <a16:rowId xmlns:a16="http://schemas.microsoft.com/office/drawing/2014/main" val="490708710"/>
+                  </a:ext>
+                </a:extLst>
+              </a:tr>
+              <a:tr h="1043563">
+                <a:tc>
+                  <a:txBody>
+                    <a:bodyPr/>
+                    <a:lstStyle/>
+                    <a:p>
+                      <a:r>
+                        <a:rPr lang="en-NL" dirty="0" err="1"/>
+                        <a:t>Probleem</a:t>
+                      </a:r>
+                      <a:r>
+                        <a:rPr lang="en-NL" dirty="0"/>
+                        <a:t> x op </a:t>
+                      </a:r>
+                      <a:r>
+                        <a:rPr lang="en-NL" dirty="0" err="1"/>
+                        <a:t>locatie</a:t>
+                      </a:r>
+                      <a:r>
+                        <a:rPr lang="en-NL" dirty="0"/>
+                        <a:t> y op datum z</a:t>
+                      </a:r>
+                    </a:p>
+                  </a:txBody>
+                  <a:tcPr/>
+                </a:tc>
+                <a:tc>
+                  <a:txBody>
+                    <a:bodyPr/>
+                    <a:lstStyle/>
+                    <a:p>
+                      <a:pPr algn="r"/>
+                      <a:r>
+                        <a:rPr lang="en-NL" dirty="0"/>
+                        <a:t>30 </a:t>
+                      </a:r>
+                    </a:p>
+                  </a:txBody>
+                  <a:tcPr/>
+                </a:tc>
+                <a:tc>
+                  <a:txBody>
+                    <a:bodyPr/>
+                    <a:lstStyle/>
+                    <a:p>
+                      <a:pPr algn="r"/>
+                      <a:r>
+                        <a:rPr lang="en-NL" dirty="0"/>
+                        <a:t>90</a:t>
+                      </a:r>
+                    </a:p>
+                  </a:txBody>
+                  <a:tcPr>
+                    <a:solidFill>
+                      <a:schemeClr val="accent6">
+                        <a:lumMod val="20000"/>
+                        <a:lumOff val="80000"/>
+                      </a:schemeClr>
+                    </a:solidFill>
+                  </a:tcPr>
+                </a:tc>
+                <a:extLst>
+                  <a:ext uri="{0D108BD9-81ED-4DB2-BD59-A6C34878D82A}">
+                    <a16:rowId xmlns:a16="http://schemas.microsoft.com/office/drawing/2014/main" val="2354946035"/>
+                  </a:ext>
+                </a:extLst>
+              </a:tr>
+              <a:tr h="629809">
+                <a:tc>
+                  <a:txBody>
+                    <a:bodyPr/>
+                    <a:lstStyle/>
+                    <a:p>
+                      <a:endParaRPr lang="en-NL" dirty="0"/>
+                    </a:p>
+                  </a:txBody>
+                  <a:tcPr/>
+                </a:tc>
+                <a:tc>
+                  <a:txBody>
+                    <a:bodyPr/>
+                    <a:lstStyle/>
+                    <a:p>
+                      <a:endParaRPr lang="en-NL" dirty="0"/>
+                    </a:p>
+                  </a:txBody>
+                  <a:tcPr/>
+                </a:tc>
+                <a:tc>
+                  <a:txBody>
+                    <a:bodyPr/>
+                    <a:lstStyle/>
+                    <a:p>
+                      <a:endParaRPr lang="en-NL" dirty="0"/>
+                    </a:p>
+                  </a:txBody>
+                  <a:tcPr>
+                    <a:solidFill>
+                      <a:schemeClr val="accent5">
+                        <a:lumMod val="20000"/>
+                        <a:lumOff val="80000"/>
+                      </a:schemeClr>
+                    </a:solidFill>
+                  </a:tcPr>
+                </a:tc>
+                <a:extLst>
+                  <a:ext uri="{0D108BD9-81ED-4DB2-BD59-A6C34878D82A}">
+                    <a16:rowId xmlns:a16="http://schemas.microsoft.com/office/drawing/2014/main" val="1388488450"/>
+                  </a:ext>
+                </a:extLst>
+              </a:tr>
+              <a:tr h="629809">
+                <a:tc>
+                  <a:txBody>
+                    <a:bodyPr/>
+                    <a:lstStyle/>
+                    <a:p>
+                      <a:endParaRPr lang="en-NL"/>
+                    </a:p>
+                  </a:txBody>
+                  <a:tcPr/>
+                </a:tc>
+                <a:tc>
+                  <a:txBody>
+                    <a:bodyPr/>
+                    <a:lstStyle/>
+                    <a:p>
+                      <a:endParaRPr lang="en-NL" dirty="0"/>
+                    </a:p>
+                  </a:txBody>
+                  <a:tcPr/>
+                </a:tc>
+                <a:tc>
+                  <a:txBody>
+                    <a:bodyPr/>
+                    <a:lstStyle/>
+                    <a:p>
+                      <a:endParaRPr lang="en-NL" dirty="0"/>
+                    </a:p>
+                  </a:txBody>
+                  <a:tcPr/>
+                </a:tc>
+                <a:extLst>
+                  <a:ext uri="{0D108BD9-81ED-4DB2-BD59-A6C34878D82A}">
+                    <a16:rowId xmlns:a16="http://schemas.microsoft.com/office/drawing/2014/main" val="334677247"/>
+                  </a:ext>
+                </a:extLst>
+              </a:tr>
+            </a:tbl>
+          </a:graphicData>
+        </a:graphic>
+      </p:graphicFrame>
+      <p:sp>
+        <p:nvSpPr>
+          <p:cNvPr id="6" name="Rectangle 5">
+            <a:extLst>
+              <a:ext uri="{FF2B5EF4-FFF2-40B4-BE49-F238E27FC236}">
+                <a16:creationId xmlns:a16="http://schemas.microsoft.com/office/drawing/2014/main" id="{2217A4AB-B353-40DA-AEF9-306772A79DEC}"/>
+              </a:ext>
+            </a:extLst>
+          </p:cNvPr>
+          <p:cNvSpPr/>
+          <p:nvPr/>
+        </p:nvSpPr>
+        <p:spPr>
+          <a:xfrm>
+            <a:off x="0" y="0"/>
+            <a:ext cx="12192000" cy="630315"/>
+          </a:xfrm>
+          <a:prstGeom prst="rect">
+            <a:avLst/>
+          </a:prstGeom>
+          <a:solidFill>
+            <a:schemeClr val="tx1">
+              <a:lumMod val="85000"/>
+              <a:lumOff val="15000"/>
+            </a:schemeClr>
+          </a:solidFill>
+        </p:spPr>
+        <p:style>
+          <a:lnRef idx="2">
+            <a:schemeClr val="accent1">
+              <a:shade val="50000"/>
+            </a:schemeClr>
+          </a:lnRef>
+          <a:fillRef idx="1">
+            <a:schemeClr val="accent1"/>
+          </a:fillRef>
+          <a:effectRef idx="0">
+            <a:schemeClr val="accent1"/>
+          </a:effectRef>
+          <a:fontRef idx="minor">
+            <a:schemeClr val="lt1"/>
+          </a:fontRef>
+        </p:style>
+        <p:txBody>
+          <a:bodyPr rtlCol="0" anchor="ctr"/>
+          <a:lstStyle/>
+          <a:p>
+            <a:r>
+              <a:rPr lang="en-NL" b="1" dirty="0"/>
+              <a:t>Dashboard 2.0</a:t>
+            </a:r>
+          </a:p>
+        </p:txBody>
+      </p:sp>
+      <p:sp>
+        <p:nvSpPr>
+          <p:cNvPr id="7" name="TextBox 6">
+            <a:extLst>
+              <a:ext uri="{FF2B5EF4-FFF2-40B4-BE49-F238E27FC236}">
+                <a16:creationId xmlns:a16="http://schemas.microsoft.com/office/drawing/2014/main" id="{B908A0FD-2BDC-4460-8BD8-9B8DE3905E38}"/>
+              </a:ext>
+            </a:extLst>
+          </p:cNvPr>
+          <p:cNvSpPr txBox="1"/>
+          <p:nvPr/>
+        </p:nvSpPr>
+        <p:spPr>
+          <a:xfrm>
+            <a:off x="875774" y="1656240"/>
+            <a:ext cx="6046681" cy="646331"/>
+          </a:xfrm>
+          <a:prstGeom prst="rect">
+            <a:avLst/>
+          </a:prstGeom>
+          <a:noFill/>
+        </p:spPr>
+        <p:txBody>
+          <a:bodyPr wrap="square" rtlCol="0">
+            <a:spAutoFit/>
+          </a:bodyPr>
+          <a:lstStyle/>
+          <a:p>
+            <a:r>
+              <a:rPr lang="en-NL" b="1" i="1" dirty="0" err="1"/>
+              <a:t>Tabel</a:t>
+            </a:r>
+            <a:r>
+              <a:rPr lang="en-NL" b="1" i="1" dirty="0"/>
+              <a:t> van de prognose van de </a:t>
+            </a:r>
+            <a:r>
+              <a:rPr lang="en-NL" b="1" i="1" dirty="0" err="1"/>
+              <a:t>monteur</a:t>
+            </a:r>
+            <a:r>
+              <a:rPr lang="en-NL" b="1" i="1" dirty="0"/>
+              <a:t> </a:t>
+            </a:r>
+            <a:r>
+              <a:rPr lang="en-NL" b="1" i="1" dirty="0" err="1"/>
+              <a:t>en</a:t>
+            </a:r>
+            <a:r>
+              <a:rPr lang="en-NL" b="1" i="1" dirty="0"/>
+              <a:t> de </a:t>
+            </a:r>
+            <a:r>
+              <a:rPr lang="en-NL" b="1" i="1" dirty="0" err="1"/>
+              <a:t>de</a:t>
+            </a:r>
+            <a:r>
+              <a:rPr lang="en-NL" b="1" i="1" dirty="0"/>
+              <a:t> prognose van de </a:t>
+            </a:r>
+            <a:r>
+              <a:rPr lang="en-NL" b="1" i="1" dirty="0" err="1"/>
+              <a:t>applicatie</a:t>
+            </a:r>
+            <a:r>
+              <a:rPr lang="en-NL" b="1" i="1" dirty="0"/>
+              <a:t> met </a:t>
+            </a:r>
+            <a:r>
+              <a:rPr lang="en-NL" b="1" i="1" dirty="0" err="1"/>
+              <a:t>betrouwbaarheid</a:t>
+            </a:r>
+            <a:r>
+              <a:rPr lang="en-NL" b="1" i="1" dirty="0"/>
+              <a:t>.</a:t>
+            </a:r>
+          </a:p>
+        </p:txBody>
+      </p:sp>
+      <p:sp>
+        <p:nvSpPr>
+          <p:cNvPr id="8" name="TextBox 7">
+            <a:extLst>
+              <a:ext uri="{FF2B5EF4-FFF2-40B4-BE49-F238E27FC236}">
+                <a16:creationId xmlns:a16="http://schemas.microsoft.com/office/drawing/2014/main" id="{73A325C1-EAB8-4726-A808-25FC16C3E5D9}"/>
+              </a:ext>
+            </a:extLst>
+          </p:cNvPr>
+          <p:cNvSpPr txBox="1"/>
+          <p:nvPr/>
+        </p:nvSpPr>
+        <p:spPr>
+          <a:xfrm>
+            <a:off x="150920" y="843379"/>
+            <a:ext cx="3879542" cy="369332"/>
+          </a:xfrm>
+          <a:prstGeom prst="rect">
+            <a:avLst/>
+          </a:prstGeom>
+          <a:noFill/>
+        </p:spPr>
+        <p:txBody>
+          <a:bodyPr wrap="square" rtlCol="0">
+            <a:spAutoFit/>
+          </a:bodyPr>
+          <a:lstStyle/>
+          <a:p>
+            <a:r>
+              <a:rPr lang="en-NL" b="1" dirty="0"/>
+              <a:t>Welkom </a:t>
+            </a:r>
+            <a:r>
+              <a:rPr lang="en-NL" b="1" dirty="0" err="1"/>
+              <a:t>treindienstleiders</a:t>
+            </a:r>
+            <a:r>
+              <a:rPr lang="en-NL" b="1" dirty="0"/>
+              <a:t> van </a:t>
             </a:r>
             <a:r>
               <a:rPr lang="en-NL" b="1" dirty="0" err="1"/>
@@ -4517,6 +5687,72 @@
           </a:fontRef>
         </p:style>
       </p:cxnSp>
+      <p:sp>
+        <p:nvSpPr>
+          <p:cNvPr id="2" name="Rectangle 1">
+            <a:extLst>
+              <a:ext uri="{FF2B5EF4-FFF2-40B4-BE49-F238E27FC236}">
+                <a16:creationId xmlns:a16="http://schemas.microsoft.com/office/drawing/2014/main" id="{01AC37B1-1EFE-499A-BE33-0B179421E62D}"/>
+              </a:ext>
+            </a:extLst>
+          </p:cNvPr>
+          <p:cNvSpPr/>
+          <p:nvPr/>
+        </p:nvSpPr>
+        <p:spPr>
+          <a:xfrm>
+            <a:off x="4030462" y="745724"/>
+            <a:ext cx="2157274" cy="466987"/>
+          </a:xfrm>
+          <a:prstGeom prst="rect">
+            <a:avLst/>
+          </a:prstGeom>
+        </p:spPr>
+        <p:style>
+          <a:lnRef idx="2">
+            <a:schemeClr val="dk1">
+              <a:shade val="50000"/>
+            </a:schemeClr>
+          </a:lnRef>
+          <a:fillRef idx="1">
+            <a:schemeClr val="dk1"/>
+          </a:fillRef>
+          <a:effectRef idx="0">
+            <a:schemeClr val="dk1"/>
+          </a:effectRef>
+          <a:fontRef idx="minor">
+            <a:schemeClr val="lt1"/>
+          </a:fontRef>
+        </p:style>
+        <p:txBody>
+          <a:bodyPr rtlCol="0" anchor="ctr"/>
+          <a:lstStyle/>
+          <a:p>
+            <a:pPr algn="ctr"/>
+            <a:r>
+              <a:rPr lang="en-NL" dirty="0" err="1"/>
+              <a:t>Informatie</a:t>
+            </a:r>
+            <a:r>
+              <a:rPr lang="en-NL" dirty="0"/>
+              <a:t> van </a:t>
+            </a:r>
+            <a:r>
+              <a:rPr lang="en-NL" dirty="0" err="1"/>
+              <a:t>aannemer</a:t>
+            </a:r>
+            <a:r>
+              <a:rPr lang="en-NL" dirty="0"/>
+              <a:t> </a:t>
+            </a:r>
+            <a:r>
+              <a:rPr lang="en-NL" dirty="0" err="1"/>
+              <a:t>invoeren</a:t>
+            </a:r>
+            <a:endParaRPr lang="en-NL" dirty="0"/>
+          </a:p>
+        </p:txBody>
+      </p:sp>
     </p:spTree>
     <p:extLst>
       <p:ext uri="{BB962C8B-B14F-4D97-AF65-F5344CB8AC3E}">
@@ -4826,21 +6062,6 @@
 </file>
 
 <file path=customXml/item1.xml><?xml version="1.0" encoding="utf-8"?>
-<?mso-contentType ?>
-<FormTemplates xmlns="http://schemas.microsoft.com/sharepoint/v3/contenttype/forms">
-  <Display>DocumentLibraryForm</Display>
-  <Edit>DocumentLibraryForm</Edit>
-  <New>DocumentLibraryForm</New>
-</FormTemplates>
-</file>
-
-<file path=customXml/item2.xml><?xml version="1.0" encoding="utf-8"?>
-<p:properties xmlns:p="http://schemas.microsoft.com/office/2006/metadata/properties" xmlns:xsi="http://www.w3.org/2001/XMLSchema-instance" xmlns:pc="http://schemas.microsoft.com/office/infopath/2007/PartnerControls">
-  <documentManagement/>
-</p:properties>
-</file>
-
-<file path=customXml/item3.xml><?xml version="1.0" encoding="utf-8"?>
 <ct:contentTypeSchema xmlns:ct="http://schemas.microsoft.com/office/2006/metadata/contentType" xmlns:ma="http://schemas.microsoft.com/office/2006/metadata/properties/metaAttributes" ct:_="" ma:_="" ma:contentTypeName="Document" ma:contentTypeID="0x01010037DCB39434F10544A1A41D5D661F9863" ma:contentTypeVersion="5" ma:contentTypeDescription="Een nieuw document maken." ma:contentTypeScope="" ma:versionID="d0cf1c712838fc1ecd4f15feeabf0ed6">
   <xsd:schema xmlns:xsd="http://www.w3.org/2001/XMLSchema" xmlns:xs="http://www.w3.org/2001/XMLSchema" xmlns:p="http://schemas.microsoft.com/office/2006/metadata/properties" xmlns:ns3="b1674010-a41e-4e9d-bdc1-760dcf115fb3" xmlns:ns4="bec4b570-c116-4701-9ccf-1e9b3cd2e734" targetNamespace="http://schemas.microsoft.com/office/2006/metadata/properties" ma:root="true" ma:fieldsID="80187f8b2b5e248ca8c771f99a83dd70" ns3:_="" ns4:_="">
     <xsd:import namespace="b1674010-a41e-4e9d-bdc1-760dcf115fb3"/>
@@ -5011,10 +6232,36 @@
 </ct:contentTypeSchema>
 </file>
 
+<file path=customXml/item2.xml><?xml version="1.0" encoding="utf-8"?>
+<p:properties xmlns:p="http://schemas.microsoft.com/office/2006/metadata/properties" xmlns:xsi="http://www.w3.org/2001/XMLSchema-instance" xmlns:pc="http://schemas.microsoft.com/office/infopath/2007/PartnerControls">
+  <documentManagement/>
+</p:properties>
+</file>
+
+<file path=customXml/item3.xml><?xml version="1.0" encoding="utf-8"?>
+<?mso-contentType ?>
+<FormTemplates xmlns="http://schemas.microsoft.com/sharepoint/v3/contenttype/forms">
+  <Display>DocumentLibraryForm</Display>
+  <Edit>DocumentLibraryForm</Edit>
+  <New>DocumentLibraryForm</New>
+</FormTemplates>
+</file>
+
 <file path=customXml/itemProps1.xml><?xml version="1.0" encoding="utf-8"?>
-<ds:datastoreItem xmlns:ds="http://schemas.openxmlformats.org/officeDocument/2006/customXml" ds:itemID="{CFAE6B31-1E9A-4824-8CCD-A42863EBD7B5}">
+<ds:datastoreItem xmlns:ds="http://schemas.openxmlformats.org/officeDocument/2006/customXml" ds:itemID="{223289C4-CAE6-4926-A77A-55516338CE9D}">
   <ds:schemaRefs>
-    <ds:schemaRef ds:uri="http://schemas.microsoft.com/sharepoint/v3/contenttype/forms"/>
+    <ds:schemaRef ds:uri="http://schemas.microsoft.com/office/2006/metadata/contentType"/>
+    <ds:schemaRef ds:uri="http://schemas.microsoft.com/office/2006/metadata/properties/metaAttributes"/>
+    <ds:schemaRef ds:uri="http://www.w3.org/2001/XMLSchema"/>
+    <ds:schemaRef ds:uri="http://schemas.microsoft.com/office/2006/metadata/properties"/>
+    <ds:schemaRef ds:uri="b1674010-a41e-4e9d-bdc1-760dcf115fb3"/>
+    <ds:schemaRef ds:uri="bec4b570-c116-4701-9ccf-1e9b3cd2e734"/>
+    <ds:schemaRef ds:uri="http://schemas.microsoft.com/office/2006/documentManagement/types"/>
+    <ds:schemaRef ds:uri="http://schemas.microsoft.com/office/infopath/2007/PartnerControls"/>
+    <ds:schemaRef ds:uri="http://schemas.openxmlformats.org/package/2006/metadata/core-properties"/>
+    <ds:schemaRef ds:uri="http://purl.org/dc/elements/1.1/"/>
+    <ds:schemaRef ds:uri="http://purl.org/dc/terms/"/>
+    <ds:schemaRef ds:uri="http://schemas.microsoft.com/internal/obd"/>
   </ds:schemaRefs>
 </ds:datastoreItem>
 </file>
@@ -5037,20 +6284,9 @@
 </file>
 
 <file path=customXml/itemProps3.xml><?xml version="1.0" encoding="utf-8"?>
-<ds:datastoreItem xmlns:ds="http://schemas.openxmlformats.org/officeDocument/2006/customXml" ds:itemID="{223289C4-CAE6-4926-A77A-55516338CE9D}">
+<ds:datastoreItem xmlns:ds="http://schemas.openxmlformats.org/officeDocument/2006/customXml" ds:itemID="{CFAE6B31-1E9A-4824-8CCD-A42863EBD7B5}">
   <ds:schemaRefs>
-    <ds:schemaRef ds:uri="http://schemas.microsoft.com/office/2006/metadata/contentType"/>
-    <ds:schemaRef ds:uri="http://schemas.microsoft.com/office/2006/metadata/properties/metaAttributes"/>
-    <ds:schemaRef ds:uri="http://www.w3.org/2001/XMLSchema"/>
-    <ds:schemaRef ds:uri="http://schemas.microsoft.com/office/2006/metadata/properties"/>
-    <ds:schemaRef ds:uri="b1674010-a41e-4e9d-bdc1-760dcf115fb3"/>
-    <ds:schemaRef ds:uri="bec4b570-c116-4701-9ccf-1e9b3cd2e734"/>
-    <ds:schemaRef ds:uri="http://schemas.microsoft.com/office/2006/documentManagement/types"/>
-    <ds:schemaRef ds:uri="http://schemas.microsoft.com/office/infopath/2007/PartnerControls"/>
-    <ds:schemaRef ds:uri="http://schemas.openxmlformats.org/package/2006/metadata/core-properties"/>
-    <ds:schemaRef ds:uri="http://purl.org/dc/elements/1.1/"/>
-    <ds:schemaRef ds:uri="http://purl.org/dc/terms/"/>
-    <ds:schemaRef ds:uri="http://schemas.microsoft.com/internal/obd"/>
+    <ds:schemaRef ds:uri="http://schemas.microsoft.com/sharepoint/v3/contenttype/forms"/>
   </ds:schemaRefs>
 </ds:datastoreItem>
 </file>
</xml_diff>

<commit_message>
laatse aanpassingen voor notebook en wireframe voor sprint 1
</commit_message>
<xml_diff>
--- a/Wireframe_dashboard.pptx
+++ b/Wireframe_dashboard.pptx
@@ -114,12 +114,58 @@
 </p:presentation>
 </file>
 
+<file path=ppt/commentAuthors.xml><?xml version="1.0" encoding="utf-8"?>
+<p:cmAuthorLst xmlns:a="http://schemas.openxmlformats.org/drawingml/2006/main" xmlns:r="http://schemas.openxmlformats.org/officeDocument/2006/relationships" xmlns:p="http://schemas.openxmlformats.org/presentationml/2006/main">
+  <p:cmAuthor id="1" name="Ama Lee" initials="AL" lastIdx="3" clrIdx="0">
+    <p:extLst>
+      <p:ext uri="{19B8F6BF-5375-455C-9EA6-DF929625EA0E}">
+        <p15:presenceInfo xmlns:p15="http://schemas.microsoft.com/office/powerpoint/2012/main" userId="Ama Lee" providerId="None"/>
+      </p:ext>
+    </p:extLst>
+  </p:cmAuthor>
+</p:cmAuthorLst>
+</file>
+
 <file path=ppt/revisionInfo.xml><?xml version="1.0" encoding="utf-8"?>
 <p1510:revInfo xmlns:a="http://schemas.openxmlformats.org/drawingml/2006/main" xmlns:r="http://schemas.openxmlformats.org/officeDocument/2006/relationships" xmlns:p1510="http://schemas.microsoft.com/office/powerpoint/2015/10/main">
   <p1510:revLst>
     <p1510:client id="{62F0E7B4-2AA7-4646-A44D-AEC06823EB12}" v="201" dt="2020-10-22T01:46:00.613"/>
   </p1510:revLst>
 </p1510:revInfo>
+</file>
+
+<file path=ppt/comments/comment1.xml><?xml version="1.0" encoding="utf-8"?>
+<p:cmLst xmlns:a="http://schemas.openxmlformats.org/drawingml/2006/main" xmlns:r="http://schemas.openxmlformats.org/officeDocument/2006/relationships" xmlns:p="http://schemas.openxmlformats.org/presentationml/2006/main">
+  <p:cm authorId="1" dt="2020-10-23T11:39:52.164" idx="1">
+    <p:pos x="7265" y="1043"/>
+    <p:text>Wat gebeurt nadat de treindienstleider de prognose en de features  invoeren.</p:text>
+    <p:extLst>
+      <p:ext uri="{C676402C-5697-4E1C-873F-D02D1690AC5C}">
+        <p15:threadingInfo xmlns:p15="http://schemas.microsoft.com/office/powerpoint/2012/main" timeZoneBias="-120"/>
+      </p:ext>
+    </p:extLst>
+  </p:cm>
+  <p:cm authorId="1" dt="2020-10-23T11:48:59.153" idx="3">
+    <p:pos x="7265" y="1179"/>
+    <p:text>Hier wordt een nieuwe storing ingevoerd . Er wordt namelijk aan de hand van de ingevoerde features de verwachte reparatie tijd  en betouwbaarheid berekent. De nieuwe storiing , reparatietijd en de betrouwebaarheid komt te zien in de tabel</p:text>
+    <p:extLst>
+      <p:ext uri="{C676402C-5697-4E1C-873F-D02D1690AC5C}">
+        <p15:threadingInfo xmlns:p15="http://schemas.microsoft.com/office/powerpoint/2012/main" timeZoneBias="-120">
+          <p15:parentCm authorId="1" idx="1"/>
+        </p15:threadingInfo>
+      </p:ext>
+    </p:extLst>
+  </p:cm>
+  <p:cm authorId="1" dt="2020-10-23T11:46:00.710" idx="2">
+    <p:pos x="10" y="10"/>
+    <p:text>In de tabel Betrouwbaarheid , wordt de betrouwbaarheid weergegven met de kleuren : rood, oranje ,geel, oichtgroene en groen, samen met de percentage.</p:text>
+    <p:extLst>
+      <p:ext uri="{C676402C-5697-4E1C-873F-D02D1690AC5C}">
+        <p15:threadingInfo xmlns:p15="http://schemas.microsoft.com/office/powerpoint/2012/main" timeZoneBias="-120"/>
+      </p:ext>
+    </p:extLst>
+  </p:cm>
+</p:cmLst>
 </file>
 
 <file path=ppt/slideLayouts/slideLayout1.xml><?xml version="1.0" encoding="utf-8"?>
@@ -271,7 +317,7 @@
           <a:p>
             <a:fld id="{7FD744FF-EE71-4D8E-8E5D-254211B72066}" type="datetimeFigureOut">
               <a:rPr lang="en-NL" smtClean="0"/>
-              <a:t>22/10/2020</a:t>
+              <a:t>23/10/2020</a:t>
             </a:fld>
             <a:endParaRPr lang="en-NL"/>
           </a:p>
@@ -471,7 +517,7 @@
           <a:p>
             <a:fld id="{7FD744FF-EE71-4D8E-8E5D-254211B72066}" type="datetimeFigureOut">
               <a:rPr lang="en-NL" smtClean="0"/>
-              <a:t>22/10/2020</a:t>
+              <a:t>23/10/2020</a:t>
             </a:fld>
             <a:endParaRPr lang="en-NL"/>
           </a:p>
@@ -681,7 +727,7 @@
           <a:p>
             <a:fld id="{7FD744FF-EE71-4D8E-8E5D-254211B72066}" type="datetimeFigureOut">
               <a:rPr lang="en-NL" smtClean="0"/>
-              <a:t>22/10/2020</a:t>
+              <a:t>23/10/2020</a:t>
             </a:fld>
             <a:endParaRPr lang="en-NL"/>
           </a:p>
@@ -881,7 +927,7 @@
           <a:p>
             <a:fld id="{7FD744FF-EE71-4D8E-8E5D-254211B72066}" type="datetimeFigureOut">
               <a:rPr lang="en-NL" smtClean="0"/>
-              <a:t>22/10/2020</a:t>
+              <a:t>23/10/2020</a:t>
             </a:fld>
             <a:endParaRPr lang="en-NL"/>
           </a:p>
@@ -1157,7 +1203,7 @@
           <a:p>
             <a:fld id="{7FD744FF-EE71-4D8E-8E5D-254211B72066}" type="datetimeFigureOut">
               <a:rPr lang="en-NL" smtClean="0"/>
-              <a:t>22/10/2020</a:t>
+              <a:t>23/10/2020</a:t>
             </a:fld>
             <a:endParaRPr lang="en-NL"/>
           </a:p>
@@ -1425,7 +1471,7 @@
           <a:p>
             <a:fld id="{7FD744FF-EE71-4D8E-8E5D-254211B72066}" type="datetimeFigureOut">
               <a:rPr lang="en-NL" smtClean="0"/>
-              <a:t>22/10/2020</a:t>
+              <a:t>23/10/2020</a:t>
             </a:fld>
             <a:endParaRPr lang="en-NL"/>
           </a:p>
@@ -1840,7 +1886,7 @@
           <a:p>
             <a:fld id="{7FD744FF-EE71-4D8E-8E5D-254211B72066}" type="datetimeFigureOut">
               <a:rPr lang="en-NL" smtClean="0"/>
-              <a:t>22/10/2020</a:t>
+              <a:t>23/10/2020</a:t>
             </a:fld>
             <a:endParaRPr lang="en-NL"/>
           </a:p>
@@ -1982,7 +2028,7 @@
           <a:p>
             <a:fld id="{7FD744FF-EE71-4D8E-8E5D-254211B72066}" type="datetimeFigureOut">
               <a:rPr lang="en-NL" smtClean="0"/>
-              <a:t>22/10/2020</a:t>
+              <a:t>23/10/2020</a:t>
             </a:fld>
             <a:endParaRPr lang="en-NL"/>
           </a:p>
@@ -2095,7 +2141,7 @@
           <a:p>
             <a:fld id="{7FD744FF-EE71-4D8E-8E5D-254211B72066}" type="datetimeFigureOut">
               <a:rPr lang="en-NL" smtClean="0"/>
-              <a:t>22/10/2020</a:t>
+              <a:t>23/10/2020</a:t>
             </a:fld>
             <a:endParaRPr lang="en-NL"/>
           </a:p>
@@ -2408,7 +2454,7 @@
           <a:p>
             <a:fld id="{7FD744FF-EE71-4D8E-8E5D-254211B72066}" type="datetimeFigureOut">
               <a:rPr lang="en-NL" smtClean="0"/>
-              <a:t>22/10/2020</a:t>
+              <a:t>23/10/2020</a:t>
             </a:fld>
             <a:endParaRPr lang="en-NL"/>
           </a:p>
@@ -2701,7 +2747,7 @@
           <a:p>
             <a:fld id="{7FD744FF-EE71-4D8E-8E5D-254211B72066}" type="datetimeFigureOut">
               <a:rPr lang="en-NL" smtClean="0"/>
-              <a:t>22/10/2020</a:t>
+              <a:t>23/10/2020</a:t>
             </a:fld>
             <a:endParaRPr lang="en-NL"/>
           </a:p>
@@ -2944,7 +2990,7 @@
           <a:p>
             <a:fld id="{7FD744FF-EE71-4D8E-8E5D-254211B72066}" type="datetimeFigureOut">
               <a:rPr lang="en-NL" smtClean="0"/>
-              <a:t>22/10/2020</a:t>
+              <a:t>23/10/2020</a:t>
             </a:fld>
             <a:endParaRPr lang="en-NL"/>
           </a:p>
@@ -3851,7 +3897,15 @@
           <a:p>
             <a:r>
               <a:rPr lang="en-NL" b="1" dirty="0"/>
-              <a:t>Welkom planners van </a:t>
+              <a:t>Welkom </a:t>
+            </a:r>
+            <a:r>
+              <a:rPr lang="en-NL" b="1" dirty="0" err="1"/>
+              <a:t>treindiestleiders</a:t>
+            </a:r>
+            <a:r>
+              <a:rPr lang="en-NL" b="1" dirty="0"/>
+              <a:t>  van </a:t>
             </a:r>
             <a:r>
               <a:rPr lang="en-NL" b="1" dirty="0" err="1"/>
@@ -3979,11 +4033,17 @@
           <p:cNvGraphicFramePr>
             <a:graphicFrameLocks noGrp="1"/>
           </p:cNvGraphicFramePr>
-          <p:nvPr/>
+          <p:nvPr>
+            <p:extLst>
+              <p:ext uri="{D42A27DB-BD31-4B8C-83A1-F6EECF244321}">
+                <p14:modId xmlns:p14="http://schemas.microsoft.com/office/powerpoint/2010/main" val="3486870778"/>
+              </p:ext>
+            </p:extLst>
+          </p:nvPr>
         </p:nvGraphicFramePr>
         <p:xfrm>
-          <a:off x="875774" y="2514599"/>
-          <a:ext cx="5553600" cy="3877705"/>
+          <a:off x="875773" y="2514599"/>
+          <a:ext cx="5542781" cy="3877705"/>
         </p:xfrm>
         <a:graphic>
           <a:graphicData uri="http://schemas.openxmlformats.org/drawingml/2006/table">
@@ -3992,21 +4052,21 @@
                 <a:tableStyleId>{5C22544A-7EE6-4342-B048-85BDC9FD1C3A}</a:tableStyleId>
               </a:tblPr>
               <a:tblGrid>
-                <a:gridCol w="1851200">
+                <a:gridCol w="1872190">
                   <a:extLst>
                     <a:ext uri="{9D8B030D-6E8A-4147-A177-3AD203B41FA5}">
                       <a16:colId xmlns:a16="http://schemas.microsoft.com/office/drawing/2014/main" val="4100399191"/>
                     </a:ext>
                   </a:extLst>
                 </a:gridCol>
-                <a:gridCol w="1851200">
+                <a:gridCol w="1872190">
                   <a:extLst>
                     <a:ext uri="{9D8B030D-6E8A-4147-A177-3AD203B41FA5}">
                       <a16:colId xmlns:a16="http://schemas.microsoft.com/office/drawing/2014/main" val="4060147756"/>
                     </a:ext>
                   </a:extLst>
                 </a:gridCol>
-                <a:gridCol w="1851200">
+                <a:gridCol w="1798401">
                   <a:extLst>
                     <a:ext uri="{9D8B030D-6E8A-4147-A177-3AD203B41FA5}">
                       <a16:colId xmlns:a16="http://schemas.microsoft.com/office/drawing/2014/main" val="1526341197"/>
@@ -4508,20 +4568,8 @@
           <a:p>
             <a:pPr algn="ctr"/>
             <a:r>
-              <a:rPr lang="en-NL" dirty="0" err="1"/>
-              <a:t>Informatie</a:t>
-            </a:r>
-            <a:r>
               <a:rPr lang="en-NL" dirty="0"/>
-              <a:t> van </a:t>
-            </a:r>
-            <a:r>
-              <a:rPr lang="en-NL" dirty="0" err="1"/>
-              <a:t>aannemer</a:t>
-            </a:r>
-            <a:r>
-              <a:rPr lang="en-NL" dirty="0"/>
-              <a:t> </a:t>
+              <a:t>Storing </a:t>
             </a:r>
             <a:r>
               <a:rPr lang="en-NL" dirty="0" err="1"/>
@@ -5077,14 +5125,14 @@
           <p:nvPr>
             <p:extLst>
               <p:ext uri="{D42A27DB-BD31-4B8C-83A1-F6EECF244321}">
-                <p14:modId xmlns:p14="http://schemas.microsoft.com/office/powerpoint/2010/main" val="1256834598"/>
+                <p14:modId xmlns:p14="http://schemas.microsoft.com/office/powerpoint/2010/main" val="3602753268"/>
               </p:ext>
             </p:extLst>
           </p:nvPr>
         </p:nvGraphicFramePr>
         <p:xfrm>
-          <a:off x="875774" y="2514599"/>
-          <a:ext cx="5553600" cy="3877705"/>
+          <a:off x="870012" y="2514599"/>
+          <a:ext cx="5559362" cy="3877705"/>
         </p:xfrm>
         <a:graphic>
           <a:graphicData uri="http://schemas.openxmlformats.org/drawingml/2006/table">
@@ -5093,7 +5141,7 @@
                 <a:tableStyleId>{5C22544A-7EE6-4342-B048-85BDC9FD1C3A}</a:tableStyleId>
               </a:tblPr>
               <a:tblGrid>
-                <a:gridCol w="1851200">
+                <a:gridCol w="1856962">
                   <a:extLst>
                     <a:ext uri="{9D8B030D-6E8A-4147-A177-3AD203B41FA5}">
                       <a16:colId xmlns:a16="http://schemas.microsoft.com/office/drawing/2014/main" val="4100399191"/>
@@ -6062,6 +6110,21 @@
 </file>
 
 <file path=customXml/item1.xml><?xml version="1.0" encoding="utf-8"?>
+<?mso-contentType ?>
+<FormTemplates xmlns="http://schemas.microsoft.com/sharepoint/v3/contenttype/forms">
+  <Display>DocumentLibraryForm</Display>
+  <Edit>DocumentLibraryForm</Edit>
+  <New>DocumentLibraryForm</New>
+</FormTemplates>
+</file>
+
+<file path=customXml/item2.xml><?xml version="1.0" encoding="utf-8"?>
+<p:properties xmlns:p="http://schemas.microsoft.com/office/2006/metadata/properties" xmlns:xsi="http://www.w3.org/2001/XMLSchema-instance" xmlns:pc="http://schemas.microsoft.com/office/infopath/2007/PartnerControls">
+  <documentManagement/>
+</p:properties>
+</file>
+
+<file path=customXml/item3.xml><?xml version="1.0" encoding="utf-8"?>
 <ct:contentTypeSchema xmlns:ct="http://schemas.microsoft.com/office/2006/metadata/contentType" xmlns:ma="http://schemas.microsoft.com/office/2006/metadata/properties/metaAttributes" ct:_="" ma:_="" ma:contentTypeName="Document" ma:contentTypeID="0x01010037DCB39434F10544A1A41D5D661F9863" ma:contentTypeVersion="5" ma:contentTypeDescription="Een nieuw document maken." ma:contentTypeScope="" ma:versionID="d0cf1c712838fc1ecd4f15feeabf0ed6">
   <xsd:schema xmlns:xsd="http://www.w3.org/2001/XMLSchema" xmlns:xs="http://www.w3.org/2001/XMLSchema" xmlns:p="http://schemas.microsoft.com/office/2006/metadata/properties" xmlns:ns3="b1674010-a41e-4e9d-bdc1-760dcf115fb3" xmlns:ns4="bec4b570-c116-4701-9ccf-1e9b3cd2e734" targetNamespace="http://schemas.microsoft.com/office/2006/metadata/properties" ma:root="true" ma:fieldsID="80187f8b2b5e248ca8c771f99a83dd70" ns3:_="" ns4:_="">
     <xsd:import namespace="b1674010-a41e-4e9d-bdc1-760dcf115fb3"/>
@@ -6232,36 +6295,10 @@
 </ct:contentTypeSchema>
 </file>
 
-<file path=customXml/item2.xml><?xml version="1.0" encoding="utf-8"?>
-<p:properties xmlns:p="http://schemas.microsoft.com/office/2006/metadata/properties" xmlns:xsi="http://www.w3.org/2001/XMLSchema-instance" xmlns:pc="http://schemas.microsoft.com/office/infopath/2007/PartnerControls">
-  <documentManagement/>
-</p:properties>
-</file>
-
-<file path=customXml/item3.xml><?xml version="1.0" encoding="utf-8"?>
-<?mso-contentType ?>
-<FormTemplates xmlns="http://schemas.microsoft.com/sharepoint/v3/contenttype/forms">
-  <Display>DocumentLibraryForm</Display>
-  <Edit>DocumentLibraryForm</Edit>
-  <New>DocumentLibraryForm</New>
-</FormTemplates>
-</file>
-
 <file path=customXml/itemProps1.xml><?xml version="1.0" encoding="utf-8"?>
-<ds:datastoreItem xmlns:ds="http://schemas.openxmlformats.org/officeDocument/2006/customXml" ds:itemID="{223289C4-CAE6-4926-A77A-55516338CE9D}">
+<ds:datastoreItem xmlns:ds="http://schemas.openxmlformats.org/officeDocument/2006/customXml" ds:itemID="{CFAE6B31-1E9A-4824-8CCD-A42863EBD7B5}">
   <ds:schemaRefs>
-    <ds:schemaRef ds:uri="http://schemas.microsoft.com/office/2006/metadata/contentType"/>
-    <ds:schemaRef ds:uri="http://schemas.microsoft.com/office/2006/metadata/properties/metaAttributes"/>
-    <ds:schemaRef ds:uri="http://www.w3.org/2001/XMLSchema"/>
-    <ds:schemaRef ds:uri="http://schemas.microsoft.com/office/2006/metadata/properties"/>
-    <ds:schemaRef ds:uri="b1674010-a41e-4e9d-bdc1-760dcf115fb3"/>
-    <ds:schemaRef ds:uri="bec4b570-c116-4701-9ccf-1e9b3cd2e734"/>
-    <ds:schemaRef ds:uri="http://schemas.microsoft.com/office/2006/documentManagement/types"/>
-    <ds:schemaRef ds:uri="http://schemas.microsoft.com/office/infopath/2007/PartnerControls"/>
-    <ds:schemaRef ds:uri="http://schemas.openxmlformats.org/package/2006/metadata/core-properties"/>
-    <ds:schemaRef ds:uri="http://purl.org/dc/elements/1.1/"/>
-    <ds:schemaRef ds:uri="http://purl.org/dc/terms/"/>
-    <ds:schemaRef ds:uri="http://schemas.microsoft.com/internal/obd"/>
+    <ds:schemaRef ds:uri="http://schemas.microsoft.com/sharepoint/v3/contenttype/forms"/>
   </ds:schemaRefs>
 </ds:datastoreItem>
 </file>
@@ -6284,9 +6321,20 @@
 </file>
 
 <file path=customXml/itemProps3.xml><?xml version="1.0" encoding="utf-8"?>
-<ds:datastoreItem xmlns:ds="http://schemas.openxmlformats.org/officeDocument/2006/customXml" ds:itemID="{CFAE6B31-1E9A-4824-8CCD-A42863EBD7B5}">
+<ds:datastoreItem xmlns:ds="http://schemas.openxmlformats.org/officeDocument/2006/customXml" ds:itemID="{223289C4-CAE6-4926-A77A-55516338CE9D}">
   <ds:schemaRefs>
-    <ds:schemaRef ds:uri="http://schemas.microsoft.com/sharepoint/v3/contenttype/forms"/>
+    <ds:schemaRef ds:uri="http://schemas.microsoft.com/office/2006/metadata/contentType"/>
+    <ds:schemaRef ds:uri="http://schemas.microsoft.com/office/2006/metadata/properties/metaAttributes"/>
+    <ds:schemaRef ds:uri="http://www.w3.org/2001/XMLSchema"/>
+    <ds:schemaRef ds:uri="http://schemas.microsoft.com/office/2006/metadata/properties"/>
+    <ds:schemaRef ds:uri="b1674010-a41e-4e9d-bdc1-760dcf115fb3"/>
+    <ds:schemaRef ds:uri="bec4b570-c116-4701-9ccf-1e9b3cd2e734"/>
+    <ds:schemaRef ds:uri="http://schemas.microsoft.com/office/2006/documentManagement/types"/>
+    <ds:schemaRef ds:uri="http://schemas.microsoft.com/office/infopath/2007/PartnerControls"/>
+    <ds:schemaRef ds:uri="http://schemas.openxmlformats.org/package/2006/metadata/core-properties"/>
+    <ds:schemaRef ds:uri="http://purl.org/dc/elements/1.1/"/>
+    <ds:schemaRef ds:uri="http://purl.org/dc/terms/"/>
+    <ds:schemaRef ds:uri="http://schemas.microsoft.com/internal/obd"/>
   </ds:schemaRefs>
 </ds:datastoreItem>
 </file>
</xml_diff>